<commit_message>
purpose と background と title
purpose と background と titlle の欄を埋めた
</commit_message>
<xml_diff>
--- a/poster_v1.pptx
+++ b/poster_v1.pptx
@@ -243,7 +243,7 @@
           <a:p>
             <a:fld id="{448C03DC-3C30-471D-A6B0-B86D344946C8}" type="datetimeFigureOut">
               <a:rPr kumimoji="1" lang="ja-JP" altLang="en-US" smtClean="0"/>
-              <a:t>2018/11/21</a:t>
+              <a:t>2018/11/27</a:t>
             </a:fld>
             <a:endParaRPr kumimoji="1" lang="ja-JP" altLang="en-US"/>
           </a:p>
@@ -445,7 +445,7 @@
           <a:p>
             <a:fld id="{448C03DC-3C30-471D-A6B0-B86D344946C8}" type="datetimeFigureOut">
               <a:rPr kumimoji="1" lang="ja-JP" altLang="en-US" smtClean="0"/>
-              <a:t>2018/11/21</a:t>
+              <a:t>2018/11/27</a:t>
             </a:fld>
             <a:endParaRPr kumimoji="1" lang="ja-JP" altLang="en-US"/>
           </a:p>
@@ -657,7 +657,7 @@
           <a:p>
             <a:fld id="{448C03DC-3C30-471D-A6B0-B86D344946C8}" type="datetimeFigureOut">
               <a:rPr kumimoji="1" lang="ja-JP" altLang="en-US" smtClean="0"/>
-              <a:t>2018/11/21</a:t>
+              <a:t>2018/11/27</a:t>
             </a:fld>
             <a:endParaRPr kumimoji="1" lang="ja-JP" altLang="en-US"/>
           </a:p>
@@ -859,7 +859,7 @@
           <a:p>
             <a:fld id="{448C03DC-3C30-471D-A6B0-B86D344946C8}" type="datetimeFigureOut">
               <a:rPr kumimoji="1" lang="ja-JP" altLang="en-US" smtClean="0"/>
-              <a:t>2018/11/21</a:t>
+              <a:t>2018/11/27</a:t>
             </a:fld>
             <a:endParaRPr kumimoji="1" lang="ja-JP" altLang="en-US"/>
           </a:p>
@@ -1103,7 +1103,7 @@
           <a:p>
             <a:fld id="{448C03DC-3C30-471D-A6B0-B86D344946C8}" type="datetimeFigureOut">
               <a:rPr kumimoji="1" lang="ja-JP" altLang="en-US" smtClean="0"/>
-              <a:t>2018/11/21</a:t>
+              <a:t>2018/11/27</a:t>
             </a:fld>
             <a:endParaRPr kumimoji="1" lang="ja-JP" altLang="en-US"/>
           </a:p>
@@ -1399,7 +1399,7 @@
           <a:p>
             <a:fld id="{448C03DC-3C30-471D-A6B0-B86D344946C8}" type="datetimeFigureOut">
               <a:rPr kumimoji="1" lang="ja-JP" altLang="en-US" smtClean="0"/>
-              <a:t>2018/11/21</a:t>
+              <a:t>2018/11/27</a:t>
             </a:fld>
             <a:endParaRPr kumimoji="1" lang="ja-JP" altLang="en-US"/>
           </a:p>
@@ -1830,7 +1830,7 @@
           <a:p>
             <a:fld id="{448C03DC-3C30-471D-A6B0-B86D344946C8}" type="datetimeFigureOut">
               <a:rPr kumimoji="1" lang="ja-JP" altLang="en-US" smtClean="0"/>
-              <a:t>2018/11/21</a:t>
+              <a:t>2018/11/27</a:t>
             </a:fld>
             <a:endParaRPr kumimoji="1" lang="ja-JP" altLang="en-US"/>
           </a:p>
@@ -1948,7 +1948,7 @@
           <a:p>
             <a:fld id="{448C03DC-3C30-471D-A6B0-B86D344946C8}" type="datetimeFigureOut">
               <a:rPr kumimoji="1" lang="ja-JP" altLang="en-US" smtClean="0"/>
-              <a:t>2018/11/21</a:t>
+              <a:t>2018/11/27</a:t>
             </a:fld>
             <a:endParaRPr kumimoji="1" lang="ja-JP" altLang="en-US"/>
           </a:p>
@@ -2043,7 +2043,7 @@
           <a:p>
             <a:fld id="{448C03DC-3C30-471D-A6B0-B86D344946C8}" type="datetimeFigureOut">
               <a:rPr kumimoji="1" lang="ja-JP" altLang="en-US" smtClean="0"/>
-              <a:t>2018/11/21</a:t>
+              <a:t>2018/11/27</a:t>
             </a:fld>
             <a:endParaRPr kumimoji="1" lang="ja-JP" altLang="en-US"/>
           </a:p>
@@ -2352,7 +2352,7 @@
           <a:p>
             <a:fld id="{448C03DC-3C30-471D-A6B0-B86D344946C8}" type="datetimeFigureOut">
               <a:rPr kumimoji="1" lang="ja-JP" altLang="en-US" smtClean="0"/>
-              <a:t>2018/11/21</a:t>
+              <a:t>2018/11/27</a:t>
             </a:fld>
             <a:endParaRPr kumimoji="1" lang="ja-JP" altLang="en-US"/>
           </a:p>
@@ -2609,7 +2609,7 @@
           <a:p>
             <a:fld id="{448C03DC-3C30-471D-A6B0-B86D344946C8}" type="datetimeFigureOut">
               <a:rPr kumimoji="1" lang="ja-JP" altLang="en-US" smtClean="0"/>
-              <a:t>2018/11/21</a:t>
+              <a:t>2018/11/27</a:t>
             </a:fld>
             <a:endParaRPr kumimoji="1" lang="ja-JP" altLang="en-US"/>
           </a:p>
@@ -2854,7 +2854,7 @@
           <a:p>
             <a:fld id="{448C03DC-3C30-471D-A6B0-B86D344946C8}" type="datetimeFigureOut">
               <a:rPr kumimoji="1" lang="ja-JP" altLang="en-US" smtClean="0"/>
-              <a:t>2018/11/21</a:t>
+              <a:t>2018/11/27</a:t>
             </a:fld>
             <a:endParaRPr kumimoji="1" lang="ja-JP" altLang="en-US"/>
           </a:p>
@@ -3322,8 +3322,8 @@
         </p:nvSpPr>
         <p:spPr>
           <a:xfrm>
-            <a:off x="2442028" y="1643743"/>
-            <a:ext cx="2185214" cy="1569660"/>
+            <a:off x="2463401" y="410473"/>
+            <a:ext cx="17162708" cy="4524315"/>
           </a:xfrm>
           <a:prstGeom prst="rect">
             <a:avLst/>
@@ -3331,14 +3331,14 @@
           <a:noFill/>
         </p:spPr>
         <p:txBody>
-          <a:bodyPr wrap="none" rtlCol="0">
+          <a:bodyPr wrap="square" rtlCol="0">
             <a:spAutoFit/>
           </a:bodyPr>
           <a:lstStyle/>
           <a:p>
             <a:r>
               <a:rPr kumimoji="1" lang="en-US" altLang="ja-JP" sz="9600" dirty="0"/>
-              <a:t>title</a:t>
+              <a:t>Examination of personality extractions using only skeleton in hip-hop dancing performances</a:t>
             </a:r>
             <a:endParaRPr kumimoji="1" lang="ja-JP" altLang="en-US" sz="9600" dirty="0"/>
           </a:p>
@@ -3608,7 +3608,7 @@
         <p:spPr>
           <a:xfrm>
             <a:off x="877497" y="8722264"/>
-            <a:ext cx="5314275" cy="707886"/>
+            <a:ext cx="9318499" cy="1938992"/>
           </a:xfrm>
           <a:prstGeom prst="rect">
             <a:avLst/>
@@ -3616,14 +3616,26 @@
           <a:noFill/>
         </p:spPr>
         <p:txBody>
-          <a:bodyPr wrap="none" rtlCol="0">
+          <a:bodyPr wrap="square" rtlCol="0">
             <a:spAutoFit/>
           </a:bodyPr>
           <a:lstStyle/>
           <a:p>
             <a:r>
-              <a:rPr kumimoji="1" lang="ja-JP" altLang="en-US" sz="4000" b="1" dirty="0"/>
-              <a:t>ここら辺に文章を描く</a:t>
+              <a:rPr kumimoji="1" lang="en-US" altLang="ja-JP" sz="4000" b="1" dirty="0"/>
+              <a:t>To make system that users can recognize</a:t>
+            </a:r>
+          </a:p>
+          <a:p>
+            <a:r>
+              <a:rPr kumimoji="1" lang="en-US" altLang="ja-JP" sz="4000" b="1" dirty="0"/>
+              <a:t>their  personality extractions and improve</a:t>
+            </a:r>
+          </a:p>
+          <a:p>
+            <a:r>
+              <a:rPr kumimoji="1" lang="en-US" altLang="ja-JP" sz="4000" b="1" dirty="0"/>
+              <a:t>their dancing skills</a:t>
             </a:r>
           </a:p>
         </p:txBody>
@@ -3643,7 +3655,7 @@
         <p:spPr>
           <a:xfrm>
             <a:off x="11044755" y="8602691"/>
-            <a:ext cx="5314275" cy="707886"/>
+            <a:ext cx="10195995" cy="3785652"/>
           </a:xfrm>
           <a:prstGeom prst="rect">
             <a:avLst/>
@@ -3651,15 +3663,52 @@
           <a:noFill/>
         </p:spPr>
         <p:txBody>
-          <a:bodyPr wrap="none" rtlCol="0">
+          <a:bodyPr wrap="square" rtlCol="0">
             <a:spAutoFit/>
           </a:bodyPr>
           <a:lstStyle/>
           <a:p>
             <a:r>
               <a:rPr kumimoji="1" lang="ja-JP" altLang="en-US" sz="4000" b="1" dirty="0"/>
-              <a:t>ここら辺に文章を描く</a:t>
-            </a:r>
+              <a:t>・</a:t>
+            </a:r>
+            <a:r>
+              <a:rPr kumimoji="1" lang="en-US" altLang="ja-JP" sz="4000" b="1" dirty="0"/>
+              <a:t>Men and Women require dance lessons in </a:t>
+            </a:r>
+          </a:p>
+          <a:p>
+            <a:r>
+              <a:rPr kumimoji="1" lang="en-US" altLang="ja-JP" sz="4000" b="1" dirty="0"/>
+              <a:t>the junior high school.</a:t>
+            </a:r>
+          </a:p>
+          <a:p>
+            <a:r>
+              <a:rPr kumimoji="1" lang="ja-JP" altLang="en-US" sz="4000" b="1" dirty="0"/>
+              <a:t>・</a:t>
+            </a:r>
+            <a:r>
+              <a:rPr kumimoji="1" lang="en-US" altLang="ja-JP" sz="4000" b="1" dirty="0"/>
+              <a:t>Elementary school students by 12.5 percent</a:t>
+            </a:r>
+          </a:p>
+          <a:p>
+            <a:r>
+              <a:rPr kumimoji="1" lang="en-US" altLang="ja-JP" sz="4000" b="1" dirty="0"/>
+              <a:t>learn dancing</a:t>
+            </a:r>
+          </a:p>
+          <a:p>
+            <a:r>
+              <a:rPr kumimoji="1" lang="ja-JP" altLang="en-US" sz="4000" b="1" dirty="0"/>
+              <a:t>・</a:t>
+            </a:r>
+            <a:r>
+              <a:rPr kumimoji="1" lang="en-US" altLang="ja-JP" sz="4000" b="1" dirty="0"/>
+              <a:t> fashion of dancing movie like “ try to dance” </a:t>
+            </a:r>
+            <a:endParaRPr kumimoji="1" lang="ja-JP" altLang="en-US" sz="4000" b="1" dirty="0"/>
           </a:p>
         </p:txBody>
       </p:sp>

</xml_diff>